<commit_message>
Updating Logistic Regression Module
</commit_message>
<xml_diff>
--- a/modules/LogisticRegression/PPT.pptx
+++ b/modules/LogisticRegression/PPT.pptx
@@ -3586,8 +3586,13 @@
           <a:p>
             <a:r>
               <a:rPr lang="en-US" dirty="0" smtClean="0"/>
-              <a:t>See HO – Section 1.5</a:t>
-            </a:r>
+              <a:t>See HO – </a:t>
+            </a:r>
+            <a:r>
+              <a:rPr lang="en-US" dirty="0" smtClean="0"/>
+              <a:t>X for a Certain Proportion</a:t>
+            </a:r>
+            <a:endParaRPr lang="en-US" dirty="0" smtClean="0"/>
           </a:p>
           <a:p>
             <a:endParaRPr lang="en-US" dirty="0"/>
@@ -3927,7 +3932,11 @@
             <a:pPr lvl="1"/>
             <a:r>
               <a:rPr lang="en-US" dirty="0" smtClean="0"/>
-              <a:t>See HO Section 2.</a:t>
+              <a:t>See HO Section </a:t>
+            </a:r>
+            <a:r>
+              <a:rPr lang="en-US" dirty="0" smtClean="0"/>
+              <a:t>Bootstrapping.</a:t>
             </a:r>
             <a:endParaRPr lang="en-US" dirty="0"/>
           </a:p>
@@ -5082,8 +5091,13 @@
           <a:p>
             <a:r>
               <a:rPr lang="en-US" dirty="0" smtClean="0"/>
-              <a:t>Examine Plots on HO – Section 1.1</a:t>
-            </a:r>
+              <a:t>Examine Plots on HO – </a:t>
+            </a:r>
+            <a:r>
+              <a:rPr lang="en-US" dirty="0" smtClean="0"/>
+              <a:t>Explorations</a:t>
+            </a:r>
+            <a:endParaRPr lang="en-US" dirty="0" smtClean="0"/>
           </a:p>
           <a:p>
             <a:endParaRPr lang="en-US" sz="1400" dirty="0" smtClean="0"/>
@@ -6259,8 +6273,13 @@
             </a:pPr>
             <a:r>
               <a:rPr lang="en-US" sz="3200" b="0" dirty="0"/>
-              <a:t>Examine HO – section 1.2</a:t>
-            </a:r>
+              <a:t>Examine HO – </a:t>
+            </a:r>
+            <a:r>
+              <a:rPr lang="en-US" sz="3200" b="0" dirty="0" smtClean="0"/>
+              <a:t>Model Fitting and …</a:t>
+            </a:r>
+            <a:endParaRPr lang="en-US" sz="3200" b="0" dirty="0"/>
           </a:p>
           <a:p>
             <a:pPr marL="342900" indent="-342900">
@@ -6499,30 +6518,21 @@
                             </p:childTnLst>
                           </p:cTn>
                         </p:par>
-                      </p:childTnLst>
-                    </p:cTn>
-                  </p:par>
-                  <p:par>
-                    <p:cTn id="7" fill="hold">
-                      <p:stCondLst>
-                        <p:cond delay="indefinite"/>
-                      </p:stCondLst>
-                      <p:childTnLst>
                         <p:par>
-                          <p:cTn id="8" fill="hold">
+                          <p:cTn id="7" fill="hold">
                             <p:stCondLst>
                               <p:cond delay="0"/>
                             </p:stCondLst>
                             <p:childTnLst>
                               <p:par>
-                                <p:cTn id="9" presetID="1" presetClass="entr" presetSubtype="0" fill="hold" nodeType="clickEffect">
+                                <p:cTn id="8" presetID="1" presetClass="entr" presetSubtype="0" fill="hold" nodeType="afterEffect">
                                   <p:stCondLst>
-                                    <p:cond delay="0"/>
+                                    <p:cond delay="1000"/>
                                   </p:stCondLst>
                                   <p:childTnLst>
                                     <p:set>
                                       <p:cBhvr>
-                                        <p:cTn id="10" dur="1" fill="hold">
+                                        <p:cTn id="9" dur="1" fill="hold">
                                           <p:stCondLst>
                                             <p:cond delay="0"/>
                                           </p:stCondLst>
@@ -6546,14 +6556,14 @@
                                 </p:cTn>
                               </p:par>
                               <p:par>
-                                <p:cTn id="11" presetID="1" presetClass="entr" presetSubtype="0" fill="hold" nodeType="withEffect">
+                                <p:cTn id="10" presetID="1" presetClass="entr" presetSubtype="0" fill="hold" nodeType="withEffect">
                                   <p:stCondLst>
-                                    <p:cond delay="0"/>
+                                    <p:cond delay="1000"/>
                                   </p:stCondLst>
                                   <p:childTnLst>
                                     <p:set>
                                       <p:cBhvr>
-                                        <p:cTn id="12" dur="1" fill="hold">
+                                        <p:cTn id="11" dur="1" fill="hold">
                                           <p:stCondLst>
                                             <p:cond delay="0"/>
                                           </p:stCondLst>
@@ -6577,14 +6587,14 @@
                                 </p:cTn>
                               </p:par>
                               <p:par>
-                                <p:cTn id="13" presetID="1" presetClass="entr" presetSubtype="0" fill="hold" nodeType="withEffect">
+                                <p:cTn id="12" presetID="1" presetClass="entr" presetSubtype="0" fill="hold" nodeType="withEffect">
                                   <p:stCondLst>
-                                    <p:cond delay="0"/>
+                                    <p:cond delay="1000"/>
                                   </p:stCondLst>
                                   <p:childTnLst>
                                     <p:set>
                                       <p:cBhvr>
-                                        <p:cTn id="14" dur="1" fill="hold">
+                                        <p:cTn id="13" dur="1" fill="hold">
                                           <p:stCondLst>
                                             <p:cond delay="0"/>
                                           </p:stCondLst>
@@ -6608,14 +6618,14 @@
                                 </p:cTn>
                               </p:par>
                               <p:par>
-                                <p:cTn id="15" presetID="1" presetClass="entr" presetSubtype="0" fill="hold" nodeType="withEffect">
+                                <p:cTn id="14" presetID="1" presetClass="entr" presetSubtype="0" fill="hold" nodeType="withEffect">
                                   <p:stCondLst>
-                                    <p:cond delay="0"/>
+                                    <p:cond delay="1000"/>
                                   </p:stCondLst>
                                   <p:childTnLst>
                                     <p:set>
                                       <p:cBhvr>
-                                        <p:cTn id="16" dur="1" fill="hold">
+                                        <p:cTn id="15" dur="1" fill="hold">
                                           <p:stCondLst>
                                             <p:cond delay="0"/>
                                           </p:stCondLst>
@@ -6822,7 +6832,11 @@
           <a:p>
             <a:r>
               <a:rPr lang="en-US" dirty="0" smtClean="0"/>
-              <a:t>Examine HO – section 1.3</a:t>
+              <a:t>Examine HO – </a:t>
+            </a:r>
+            <a:r>
+              <a:rPr lang="en-US" dirty="0" smtClean="0"/>
+              <a:t>Interpretation of slope</a:t>
             </a:r>
             <a:endParaRPr lang="en-US" sz="7200" dirty="0"/>
           </a:p>
@@ -7157,11 +7171,11 @@
           <a:p>
             <a:r>
               <a:rPr lang="en-US" dirty="0"/>
-              <a:t>Examine HO – section </a:t>
+              <a:t>Examine HO – </a:t>
             </a:r>
             <a:r>
               <a:rPr lang="en-US" dirty="0" smtClean="0"/>
-              <a:t>1.3</a:t>
+              <a:t>Interpretation of slope</a:t>
             </a:r>
             <a:endParaRPr lang="en-US" sz="7200" dirty="0"/>
           </a:p>
@@ -7547,7 +7561,11 @@
             </a:r>
             <a:r>
               <a:rPr lang="en-US" dirty="0" smtClean="0"/>
-              <a:t>results in Section 1.2</a:t>
+              <a:t>results in </a:t>
+            </a:r>
+            <a:r>
+              <a:rPr lang="en-US" dirty="0" smtClean="0"/>
+              <a:t>Model fitting and …</a:t>
             </a:r>
             <a:endParaRPr lang="en-US" dirty="0"/>
           </a:p>
@@ -7890,7 +7908,11 @@
           <a:p>
             <a:r>
               <a:rPr lang="en-US" dirty="0" smtClean="0"/>
-              <a:t>See Section 1.4</a:t>
+              <a:t>See Section </a:t>
+            </a:r>
+            <a:r>
+              <a:rPr lang="en-US" dirty="0" smtClean="0"/>
+              <a:t>Predicting Probabilities ….</a:t>
             </a:r>
             <a:endParaRPr lang="en-US" dirty="0"/>
           </a:p>

</xml_diff>

<commit_message>
Updated logisitic regression PPT slides
</commit_message>
<xml_diff>
--- a/modules/LogisticRegression/PPT.pptx
+++ b/modules/LogisticRegression/PPT.pptx
@@ -601,6 +601,91 @@
     </a:lvl9pPr>
   </p:notesStyle>
 </p:notesMaster>
+</file>
+
+<file path=ppt/notesSlides/notesSlide1.xml><?xml version="1.0" encoding="utf-8"?>
+<p:notes xmlns:a="http://schemas.openxmlformats.org/drawingml/2006/main" xmlns:r="http://schemas.openxmlformats.org/officeDocument/2006/relationships" xmlns:p="http://schemas.openxmlformats.org/presentationml/2006/main">
+  <p:cSld>
+    <p:spTree>
+      <p:nvGrpSpPr>
+        <p:cNvPr id="1" name=""/>
+        <p:cNvGrpSpPr/>
+        <p:nvPr/>
+      </p:nvGrpSpPr>
+      <p:grpSpPr>
+        <a:xfrm>
+          <a:off x="0" y="0"/>
+          <a:ext cx="0" cy="0"/>
+          <a:chOff x="0" y="0"/>
+          <a:chExt cx="0" cy="0"/>
+        </a:xfrm>
+      </p:grpSpPr>
+      <p:sp>
+        <p:nvSpPr>
+          <p:cNvPr id="2" name="Slide Image Placeholder 1"/>
+          <p:cNvSpPr>
+            <a:spLocks noGrp="1" noRot="1" noChangeAspect="1"/>
+          </p:cNvSpPr>
+          <p:nvPr>
+            <p:ph type="sldImg"/>
+          </p:nvPr>
+        </p:nvSpPr>
+        <p:spPr/>
+      </p:sp>
+      <p:sp>
+        <p:nvSpPr>
+          <p:cNvPr id="3" name="Notes Placeholder 2"/>
+          <p:cNvSpPr>
+            <a:spLocks noGrp="1"/>
+          </p:cNvSpPr>
+          <p:nvPr>
+            <p:ph type="body" idx="1"/>
+          </p:nvPr>
+        </p:nvSpPr>
+        <p:spPr/>
+        <p:txBody>
+          <a:bodyPr/>
+          <a:lstStyle/>
+          <a:p>
+            <a:endParaRPr lang="en-US" dirty="0"/>
+          </a:p>
+        </p:txBody>
+      </p:sp>
+      <p:sp>
+        <p:nvSpPr>
+          <p:cNvPr id="4" name="Slide Number Placeholder 3"/>
+          <p:cNvSpPr>
+            <a:spLocks noGrp="1"/>
+          </p:cNvSpPr>
+          <p:nvPr>
+            <p:ph type="sldNum" sz="quarter" idx="10"/>
+          </p:nvPr>
+        </p:nvSpPr>
+        <p:spPr/>
+        <p:txBody>
+          <a:bodyPr/>
+          <a:lstStyle/>
+          <a:p>
+            <a:fld id="{CF834186-2AA3-4A43-8663-E23780E3179D}" type="slidenum">
+              <a:rPr lang="en-US" smtClean="0"/>
+              <a:pPr/>
+              <a:t>12</a:t>
+            </a:fld>
+            <a:endParaRPr lang="en-US"/>
+          </a:p>
+        </p:txBody>
+      </p:sp>
+    </p:spTree>
+    <p:extLst>
+      <p:ext uri="{BB962C8B-B14F-4D97-AF65-F5344CB8AC3E}">
+        <p14:creationId xmlns:p14="http://schemas.microsoft.com/office/powerpoint/2010/main" val="1437557848"/>
+      </p:ext>
+    </p:extLst>
+  </p:cSld>
+  <p:clrMapOvr>
+    <a:masterClrMapping/>
+  </p:clrMapOvr>
+</p:notes>
 </file>
 
 <file path=ppt/slideLayouts/slideLayout1.xml><?xml version="1.0" encoding="utf-8"?>
@@ -3586,13 +3671,8 @@
           <a:p>
             <a:r>
               <a:rPr lang="en-US" dirty="0" smtClean="0"/>
-              <a:t>See HO – </a:t>
-            </a:r>
-            <a:r>
-              <a:rPr lang="en-US" dirty="0" smtClean="0"/>
-              <a:t>X for a Certain Proportion</a:t>
-            </a:r>
-            <a:endParaRPr lang="en-US" dirty="0" smtClean="0"/>
+              <a:t>See HO – X for a Certain Proportion</a:t>
+            </a:r>
           </a:p>
           <a:p>
             <a:endParaRPr lang="en-US" dirty="0"/>
@@ -3932,11 +4012,7 @@
             <a:pPr lvl="1"/>
             <a:r>
               <a:rPr lang="en-US" dirty="0" smtClean="0"/>
-              <a:t>See HO Section </a:t>
-            </a:r>
-            <a:r>
-              <a:rPr lang="en-US" dirty="0" smtClean="0"/>
-              <a:t>Bootstrapping.</a:t>
+              <a:t>See HO Section Bootstrapping.</a:t>
             </a:r>
             <a:endParaRPr lang="en-US" dirty="0"/>
           </a:p>
@@ -4142,7 +4218,12 @@
             <p:ph type="title"/>
           </p:nvPr>
         </p:nvSpPr>
-        <p:spPr/>
+        <p:spPr>
+          <a:xfrm>
+            <a:off x="65088" y="0"/>
+            <a:ext cx="9012237" cy="685800"/>
+          </a:xfrm>
+        </p:spPr>
         <p:txBody>
           <a:bodyPr/>
           <a:lstStyle/>
@@ -4167,8 +4248,8 @@
         </p:nvSpPr>
         <p:spPr>
           <a:xfrm>
-            <a:off x="457200" y="1143000"/>
-            <a:ext cx="8686800" cy="5334000"/>
+            <a:off x="0" y="685799"/>
+            <a:ext cx="9144000" cy="5864225"/>
           </a:xfrm>
         </p:spPr>
         <p:txBody>
@@ -4183,7 +4264,15 @@
           <a:p>
             <a:r>
               <a:rPr lang="en-US" sz="2800" dirty="0" smtClean="0"/>
-              <a:t>Also recorded demographic variables for each household: income, size, monthly mortgage payment, age of head</a:t>
+              <a:t>Also recorded </a:t>
+            </a:r>
+            <a:r>
+              <a:rPr lang="en-US" sz="2800" dirty="0" smtClean="0"/>
+              <a:t>household demographic variables: </a:t>
+            </a:r>
+            <a:r>
+              <a:rPr lang="en-US" sz="2800" dirty="0" smtClean="0"/>
+              <a:t>income, size, monthly mortgage payment, age of head</a:t>
             </a:r>
           </a:p>
           <a:p>
@@ -4203,14 +4292,30 @@
             <a:pPr lvl="1"/>
             <a:r>
               <a:rPr lang="en-US" sz="2400" dirty="0" smtClean="0"/>
-              <a:t>What is the probability of acceptance for a household with an income of $80000.</a:t>
-            </a:r>
+              <a:t>What is the probability of acceptance for a household with an income of $</a:t>
+            </a:r>
+            <a:r>
+              <a:rPr lang="en-US" sz="2400" dirty="0" smtClean="0"/>
+              <a:t>80000? Odds of acceptance?</a:t>
+            </a:r>
+            <a:endParaRPr lang="en-US" sz="2400" dirty="0" smtClean="0"/>
           </a:p>
           <a:p>
             <a:pPr lvl="1"/>
             <a:r>
               <a:rPr lang="en-US" sz="2400" dirty="0" smtClean="0"/>
-              <a:t>How much does odds of acceptance change for each $1000 increase in household income?</a:t>
+              <a:t>How much does odds of acceptance change for each $1000 increase in household income</a:t>
+            </a:r>
+            <a:r>
+              <a:rPr lang="en-US" sz="2400" dirty="0" smtClean="0"/>
+              <a:t>?</a:t>
+            </a:r>
+          </a:p>
+          <a:p>
+            <a:pPr lvl="1"/>
+            <a:r>
+              <a:rPr lang="en-US" sz="2400" dirty="0" smtClean="0"/>
+              <a:t>How much does the probability of acceptance change for $1000 increase in household income?</a:t>
             </a:r>
             <a:endParaRPr lang="en-US" sz="2400" dirty="0"/>
           </a:p>
@@ -4452,6 +4557,37 @@
                                           <p:spTgt spid="3">
                                             <p:txEl>
                                               <p:pRg st="5" end="5"/>
+                                            </p:txEl>
+                                          </p:spTgt>
+                                        </p:tgtEl>
+                                        <p:attrNameLst>
+                                          <p:attrName>style.visibility</p:attrName>
+                                        </p:attrNameLst>
+                                      </p:cBhvr>
+                                      <p:to>
+                                        <p:strVal val="visible"/>
+                                      </p:to>
+                                    </p:set>
+                                  </p:childTnLst>
+                                </p:cTn>
+                              </p:par>
+                              <p:par>
+                                <p:cTn id="17" presetID="1" presetClass="entr" presetSubtype="0" fill="hold" grpId="0" nodeType="withEffect">
+                                  <p:stCondLst>
+                                    <p:cond delay="0"/>
+                                  </p:stCondLst>
+                                  <p:childTnLst>
+                                    <p:set>
+                                      <p:cBhvr>
+                                        <p:cTn id="18" dur="1" fill="hold">
+                                          <p:stCondLst>
+                                            <p:cond delay="0"/>
+                                          </p:stCondLst>
+                                        </p:cTn>
+                                        <p:tgtEl>
+                                          <p:spTgt spid="3">
+                                            <p:txEl>
+                                              <p:pRg st="6" end="6"/>
                                             </p:txEl>
                                           </p:spTgt>
                                         </p:tgtEl>
@@ -5091,13 +5227,8 @@
           <a:p>
             <a:r>
               <a:rPr lang="en-US" dirty="0" smtClean="0"/>
-              <a:t>Examine Plots on HO – </a:t>
-            </a:r>
-            <a:r>
-              <a:rPr lang="en-US" dirty="0" smtClean="0"/>
-              <a:t>Explorations</a:t>
-            </a:r>
-            <a:endParaRPr lang="en-US" dirty="0" smtClean="0"/>
+              <a:t>Examine Plots on HO – Explorations</a:t>
+            </a:r>
           </a:p>
           <a:p>
             <a:endParaRPr lang="en-US" sz="1400" dirty="0" smtClean="0"/>
@@ -6832,11 +6963,7 @@
           <a:p>
             <a:r>
               <a:rPr lang="en-US" dirty="0" smtClean="0"/>
-              <a:t>Examine HO – </a:t>
-            </a:r>
-            <a:r>
-              <a:rPr lang="en-US" dirty="0" smtClean="0"/>
-              <a:t>Interpretation of slope</a:t>
+              <a:t>Examine HO – Interpretation of slope</a:t>
             </a:r>
             <a:endParaRPr lang="en-US" sz="7200" dirty="0"/>
           </a:p>
@@ -7561,11 +7688,7 @@
             </a:r>
             <a:r>
               <a:rPr lang="en-US" dirty="0" smtClean="0"/>
-              <a:t>results in </a:t>
-            </a:r>
-            <a:r>
-              <a:rPr lang="en-US" dirty="0" smtClean="0"/>
-              <a:t>Model fitting and …</a:t>
+              <a:t>results in Model fitting and …</a:t>
             </a:r>
             <a:endParaRPr lang="en-US" dirty="0"/>
           </a:p>
@@ -7908,11 +8031,7 @@
           <a:p>
             <a:r>
               <a:rPr lang="en-US" dirty="0" smtClean="0"/>
-              <a:t>See Section </a:t>
-            </a:r>
-            <a:r>
-              <a:rPr lang="en-US" dirty="0" smtClean="0"/>
-              <a:t>Predicting Probabilities ….</a:t>
+              <a:t>See Section Predicting Probabilities ….</a:t>
             </a:r>
             <a:endParaRPr lang="en-US" dirty="0"/>
           </a:p>

</xml_diff>